<commit_message>
Final files are being added to the repository.
</commit_message>
<xml_diff>
--- a/CSE 524 - Presentation.pptx
+++ b/CSE 524 - Presentation.pptx
@@ -144,6 +144,35 @@
 </p:presentation>
 </file>
 
+<file path=ppt/changesInfos/changesInfo1.xml><?xml version="1.0" encoding="utf-8"?>
+<pc:chgInfo xmlns:a="http://schemas.openxmlformats.org/drawingml/2006/main" xmlns:r="http://schemas.openxmlformats.org/officeDocument/2006/relationships" xmlns:ac="http://schemas.microsoft.com/office/drawing/2013/main/command" xmlns:pc="http://schemas.microsoft.com/office/powerpoint/2013/main/command">
+  <pc:docChgLst>
+    <pc:chgData name="Shreyas Habade" userId="01cdc71e-6517-431d-b0c7-b7c2d9cda0c0" providerId="ADAL" clId="{A2348208-E8D5-4F29-B177-8D225C1DCDB3}"/>
+    <pc:docChg chg="modSld">
+      <pc:chgData name="Shreyas Habade" userId="01cdc71e-6517-431d-b0c7-b7c2d9cda0c0" providerId="ADAL" clId="{A2348208-E8D5-4F29-B177-8D225C1DCDB3}" dt="2024-12-16T07:07:10.911" v="1" actId="20577"/>
+      <pc:docMkLst>
+        <pc:docMk/>
+      </pc:docMkLst>
+      <pc:sldChg chg="modSp mod">
+        <pc:chgData name="Shreyas Habade" userId="01cdc71e-6517-431d-b0c7-b7c2d9cda0c0" providerId="ADAL" clId="{A2348208-E8D5-4F29-B177-8D225C1DCDB3}" dt="2024-12-16T07:07:10.911" v="1" actId="20577"/>
+        <pc:sldMkLst>
+          <pc:docMk/>
+          <pc:sldMk cId="1708121281" sldId="259"/>
+        </pc:sldMkLst>
+        <pc:spChg chg="mod">
+          <ac:chgData name="Shreyas Habade" userId="01cdc71e-6517-431d-b0c7-b7c2d9cda0c0" providerId="ADAL" clId="{A2348208-E8D5-4F29-B177-8D225C1DCDB3}" dt="2024-12-16T07:07:10.911" v="1" actId="20577"/>
+          <ac:spMkLst>
+            <pc:docMk/>
+            <pc:sldMk cId="1708121281" sldId="259"/>
+            <ac:spMk id="3" creationId="{C27793B2-23CF-6547-ADD9-DE0FE83FAC5C}"/>
+          </ac:spMkLst>
+        </pc:spChg>
+      </pc:sldChg>
+    </pc:docChg>
+  </pc:docChgLst>
+</pc:chgInfo>
+</file>
+
 <file path=ppt/notesMasters/notesMaster1.xml><?xml version="1.0" encoding="utf-8"?>
 <p:notesMaster xmlns:a="http://schemas.openxmlformats.org/drawingml/2006/main" xmlns:r="http://schemas.openxmlformats.org/officeDocument/2006/relationships" xmlns:p="http://schemas.openxmlformats.org/presentationml/2006/main">
   <p:cSld>
@@ -226,7 +255,7 @@
           <a:p>
             <a:fld id="{B73CD996-931B-1041-8CED-4F36655CE847}" type="datetimeFigureOut">
               <a:rPr lang="en-US" smtClean="0"/>
-              <a:t>5/10/2024</a:t>
+              <a:t>12/16/2024</a:t>
             </a:fld>
             <a:endParaRPr lang="en-US"/>
           </a:p>
@@ -8882,7 +8911,15 @@
             </a:pPr>
             <a:r>
               <a:rPr lang="en-US" dirty="0"/>
-              <a:t>Taking the ideas proposed by Tomas Muller, trying to implement the fast triangle-triangle intersection test initially, then used the collision algorithm. </a:t>
+              <a:t>Taking the ideas proposed </a:t>
+            </a:r>
+            <a:r>
+              <a:rPr lang="en-US"/>
+              <a:t>by z` </a:t>
+            </a:r>
+            <a:r>
+              <a:rPr lang="en-US" dirty="0"/>
+              <a:t>Muller, trying to implement the fast triangle-triangle intersection test initially, then used the collision algorithm. </a:t>
             </a:r>
           </a:p>
           <a:p>
@@ -10936,15 +10973,6 @@
 </file>
 
 <file path=customXml/item1.xml><?xml version="1.0" encoding="utf-8"?>
-<?mso-contentType ?>
-<FormTemplates xmlns="http://schemas.microsoft.com/sharepoint/v3/contenttype/forms">
-  <Display>DocumentLibraryForm</Display>
-  <Edit>DocumentLibraryForm</Edit>
-  <New>DocumentLibraryForm</New>
-</FormTemplates>
-</file>
-
-<file path=customXml/item2.xml><?xml version="1.0" encoding="utf-8"?>
 <ct:contentTypeSchema xmlns:ct="http://schemas.microsoft.com/office/2006/metadata/contentType" xmlns:ma="http://schemas.microsoft.com/office/2006/metadata/properties/metaAttributes" ct:_="" ma:_="" ma:contentTypeName="Document" ma:contentTypeID="0x010100DD1E88DAFBA13A41A4D30A432117ECB5" ma:contentTypeVersion="6" ma:contentTypeDescription="Create a new document." ma:contentTypeScope="" ma:versionID="c7e8de08f0fa02ee7bf31581a1f43ea3">
   <xsd:schema xmlns:xsd="http://www.w3.org/2001/XMLSchema" xmlns:xs="http://www.w3.org/2001/XMLSchema" xmlns:p="http://schemas.microsoft.com/office/2006/metadata/properties" xmlns:ns3="76d338c0-f1cd-4263-a434-68de07724936" xmlns:ns4="ad22f652-b849-48c5-a37f-d043aa2d1747" targetNamespace="http://schemas.microsoft.com/office/2006/metadata/properties" ma:root="true" ma:fieldsID="ed89be09f0f7ff6981b55b1eab570d36" ns3:_="" ns4:_="">
     <xsd:import namespace="76d338c0-f1cd-4263-a434-68de07724936"/>
@@ -11121,6 +11149,15 @@
 </ct:contentTypeSchema>
 </file>
 
+<file path=customXml/item2.xml><?xml version="1.0" encoding="utf-8"?>
+<?mso-contentType ?>
+<FormTemplates xmlns="http://schemas.microsoft.com/sharepoint/v3/contenttype/forms">
+  <Display>DocumentLibraryForm</Display>
+  <Edit>DocumentLibraryForm</Edit>
+  <New>DocumentLibraryForm</New>
+</FormTemplates>
+</file>
+
 <file path=customXml/item3.xml><?xml version="1.0" encoding="utf-8"?>
 <p:properties xmlns:p="http://schemas.microsoft.com/office/2006/metadata/properties" xmlns:xsi="http://www.w3.org/2001/XMLSchema-instance" xmlns:pc="http://schemas.microsoft.com/office/infopath/2007/PartnerControls">
   <documentManagement>
@@ -11130,14 +11167,6 @@
 </file>
 
 <file path=customXml/itemProps1.xml><?xml version="1.0" encoding="utf-8"?>
-<ds:datastoreItem xmlns:ds="http://schemas.openxmlformats.org/officeDocument/2006/customXml" ds:itemID="{BF664465-AF2C-4FAE-BD89-F15E22A50BB5}">
-  <ds:schemaRefs>
-    <ds:schemaRef ds:uri="http://schemas.microsoft.com/sharepoint/v3/contenttype/forms"/>
-  </ds:schemaRefs>
-</ds:datastoreItem>
-</file>
-
-<file path=customXml/itemProps2.xml><?xml version="1.0" encoding="utf-8"?>
 <ds:datastoreItem xmlns:ds="http://schemas.openxmlformats.org/officeDocument/2006/customXml" ds:itemID="{78E55DEA-F8EA-41BB-9EA5-5C14F0444089}">
   <ds:schemaRefs>
     <ds:schemaRef ds:uri="http://schemas.microsoft.com/office/2006/metadata/contentType"/>
@@ -11152,6 +11181,14 @@
     <ds:schemaRef ds:uri="http://purl.org/dc/elements/1.1/"/>
     <ds:schemaRef ds:uri="http://purl.org/dc/terms/"/>
     <ds:schemaRef ds:uri="http://schemas.microsoft.com/internal/obd"/>
+  </ds:schemaRefs>
+</ds:datastoreItem>
+</file>
+
+<file path=customXml/itemProps2.xml><?xml version="1.0" encoding="utf-8"?>
+<ds:datastoreItem xmlns:ds="http://schemas.openxmlformats.org/officeDocument/2006/customXml" ds:itemID="{BF664465-AF2C-4FAE-BD89-F15E22A50BB5}">
+  <ds:schemaRefs>
+    <ds:schemaRef ds:uri="http://schemas.microsoft.com/sharepoint/v3/contenttype/forms"/>
   </ds:schemaRefs>
 </ds:datastoreItem>
 </file>

</xml_diff>